<commit_message>
Powerpoint Slide is Added
</commit_message>
<xml_diff>
--- a/Web Fundamentals Project.pptx
+++ b/Web Fundamentals Project.pptx
@@ -111,6 +111,11 @@
       </a:defRPr>
     </a:lvl9pPr>
   </p:defaultTextStyle>
+  <p:extLst>
+    <p:ext uri="{EFAFB233-063F-42B5-8137-9DF3F51BA10A}">
+      <p15:sldGuideLst xmlns:p15="http://schemas.microsoft.com/office/powerpoint/2012/main"/>
+    </p:ext>
+  </p:extLst>
 </p:presentation>
 </file>
 
@@ -8146,13 +8151,13 @@
   <p:clrMapOvr>
     <a:masterClrMapping/>
   </p:clrMapOvr>
-  <mc:AlternateContent xmlns:mc="http://schemas.openxmlformats.org/markup-compatibility/2006">
-    <mc:Choice xmlns:p14="http://schemas.microsoft.com/office/powerpoint/2010/main" Requires="p14">
+  <mc:AlternateContent xmlns:mc="http://schemas.openxmlformats.org/markup-compatibility/2006" xmlns:p14="http://schemas.microsoft.com/office/powerpoint/2010/main">
+    <mc:Choice Requires="p14">
       <p:transition spd="med" p14:dur="700">
         <p:fade/>
       </p:transition>
     </mc:Choice>
-    <mc:Fallback>
+    <mc:Fallback xmlns="">
       <p:transition spd="med">
         <p:fade/>
       </p:transition>
@@ -8223,13 +8228,13 @@
         </p:nvSpPr>
         <p:spPr>
           <a:xfrm>
-            <a:off x="2589212" y="2275166"/>
-            <a:ext cx="8915400" cy="3636056"/>
+            <a:off x="2589212" y="2275165"/>
+            <a:ext cx="8915400" cy="3986957"/>
           </a:xfrm>
         </p:spPr>
         <p:txBody>
           <a:bodyPr>
-            <a:normAutofit fontScale="92500"/>
+            <a:normAutofit lnSpcReduction="10000"/>
           </a:bodyPr>
           <a:lstStyle/>
           <a:p>
@@ -8423,13 +8428,13 @@
   <p:clrMapOvr>
     <a:masterClrMapping/>
   </p:clrMapOvr>
-  <mc:AlternateContent xmlns:mc="http://schemas.openxmlformats.org/markup-compatibility/2006">
-    <mc:Choice xmlns:p14="http://schemas.microsoft.com/office/powerpoint/2010/main" Requires="p14">
+  <mc:AlternateContent xmlns:mc="http://schemas.openxmlformats.org/markup-compatibility/2006" xmlns:p14="http://schemas.microsoft.com/office/powerpoint/2010/main">
+    <mc:Choice Requires="p14">
       <p:transition spd="med" p14:dur="700">
         <p:fade/>
       </p:transition>
     </mc:Choice>
-    <mc:Fallback>
+    <mc:Fallback xmlns="">
       <p:transition spd="med">
         <p:fade/>
       </p:transition>
@@ -8965,13 +8970,13 @@
   <p:clrMapOvr>
     <a:masterClrMapping/>
   </p:clrMapOvr>
-  <mc:AlternateContent xmlns:mc="http://schemas.openxmlformats.org/markup-compatibility/2006">
-    <mc:Choice xmlns:p14="http://schemas.microsoft.com/office/powerpoint/2010/main" Requires="p14">
+  <mc:AlternateContent xmlns:mc="http://schemas.openxmlformats.org/markup-compatibility/2006" xmlns:p14="http://schemas.microsoft.com/office/powerpoint/2010/main">
+    <mc:Choice Requires="p14">
       <p:transition spd="med" p14:dur="700">
         <p:fade/>
       </p:transition>
     </mc:Choice>
-    <mc:Fallback>
+    <mc:Fallback xmlns="">
       <p:transition spd="med">
         <p:fade/>
       </p:transition>
@@ -9520,13 +9525,13 @@
   <p:clrMapOvr>
     <a:masterClrMapping/>
   </p:clrMapOvr>
-  <mc:AlternateContent xmlns:mc="http://schemas.openxmlformats.org/markup-compatibility/2006">
-    <mc:Choice xmlns:p14="http://schemas.microsoft.com/office/powerpoint/2010/main" Requires="p14">
+  <mc:AlternateContent xmlns:mc="http://schemas.openxmlformats.org/markup-compatibility/2006" xmlns:p14="http://schemas.microsoft.com/office/powerpoint/2010/main">
+    <mc:Choice Requires="p14">
       <p:transition spd="med" p14:dur="700">
         <p:fade/>
       </p:transition>
     </mc:Choice>
-    <mc:Fallback>
+    <mc:Fallback xmlns="">
       <p:transition spd="med">
         <p:fade/>
       </p:transition>
@@ -9975,11 +9980,7 @@
             </a:r>
             <a:r>
               <a:rPr lang="en-US" dirty="0"/>
-              <a:t> </a:t>
-            </a:r>
-            <a:r>
-              <a:rPr lang="en-US" dirty="0"/>
-              <a:t>W</a:t>
+              <a:t> W</a:t>
             </a:r>
             <a:r>
               <a:rPr lang="en-US" dirty="0" smtClean="0"/>
@@ -10091,13 +10092,13 @@
   <p:clrMapOvr>
     <a:masterClrMapping/>
   </p:clrMapOvr>
-  <mc:AlternateContent xmlns:mc="http://schemas.openxmlformats.org/markup-compatibility/2006">
-    <mc:Choice xmlns:p14="http://schemas.microsoft.com/office/powerpoint/2010/main" Requires="p14">
+  <mc:AlternateContent xmlns:mc="http://schemas.openxmlformats.org/markup-compatibility/2006" xmlns:p14="http://schemas.microsoft.com/office/powerpoint/2010/main">
+    <mc:Choice Requires="p14">
       <p:transition spd="med" p14:dur="700">
         <p:fade/>
       </p:transition>
     </mc:Choice>
-    <mc:Fallback>
+    <mc:Fallback xmlns="">
       <p:transition spd="med">
         <p:fade/>
       </p:transition>

</xml_diff>